<commit_message>
Voorbeelden toegevoegd aan github
</commit_message>
<xml_diff>
--- a/ESD Presentatie RealTimeClock.pptx
+++ b/ESD Presentatie RealTimeClock.pptx
@@ -620,7 +620,7 @@
           <a:p>
             <a:fld id="{407978F9-E225-44FC-B6D5-6C0BF9254ECD}" type="datetimeFigureOut">
               <a:rPr lang="nl-NL" smtClean="0"/>
-              <a:t>21-3-2018</a:t>
+              <a:t>23-5-2018</a:t>
             </a:fld>
             <a:endParaRPr lang="nl-NL"/>
           </a:p>
@@ -919,7 +919,7 @@
           <a:p>
             <a:fld id="{407978F9-E225-44FC-B6D5-6C0BF9254ECD}" type="datetimeFigureOut">
               <a:rPr lang="nl-NL" smtClean="0"/>
-              <a:t>21-3-2018</a:t>
+              <a:t>23-5-2018</a:t>
             </a:fld>
             <a:endParaRPr lang="nl-NL"/>
           </a:p>
@@ -1170,7 +1170,7 @@
           <a:p>
             <a:fld id="{407978F9-E225-44FC-B6D5-6C0BF9254ECD}" type="datetimeFigureOut">
               <a:rPr lang="nl-NL" smtClean="0"/>
-              <a:t>21-3-2018</a:t>
+              <a:t>23-5-2018</a:t>
             </a:fld>
             <a:endParaRPr lang="nl-NL"/>
           </a:p>
@@ -1713,7 +1713,7 @@
           <a:p>
             <a:fld id="{407978F9-E225-44FC-B6D5-6C0BF9254ECD}" type="datetimeFigureOut">
               <a:rPr lang="nl-NL" smtClean="0"/>
-              <a:t>21-3-2018</a:t>
+              <a:t>23-5-2018</a:t>
             </a:fld>
             <a:endParaRPr lang="nl-NL"/>
           </a:p>
@@ -1964,7 +1964,7 @@
           <a:p>
             <a:fld id="{407978F9-E225-44FC-B6D5-6C0BF9254ECD}" type="datetimeFigureOut">
               <a:rPr lang="nl-NL" smtClean="0"/>
-              <a:t>21-3-2018</a:t>
+              <a:t>23-5-2018</a:t>
             </a:fld>
             <a:endParaRPr lang="nl-NL"/>
           </a:p>
@@ -2499,7 +2499,7 @@
           <a:p>
             <a:fld id="{407978F9-E225-44FC-B6D5-6C0BF9254ECD}" type="datetimeFigureOut">
               <a:rPr lang="nl-NL" smtClean="0"/>
-              <a:t>21-3-2018</a:t>
+              <a:t>23-5-2018</a:t>
             </a:fld>
             <a:endParaRPr lang="nl-NL"/>
           </a:p>
@@ -2799,7 +2799,7 @@
           <a:p>
             <a:fld id="{407978F9-E225-44FC-B6D5-6C0BF9254ECD}" type="datetimeFigureOut">
               <a:rPr lang="nl-NL" smtClean="0"/>
-              <a:t>21-3-2018</a:t>
+              <a:t>23-5-2018</a:t>
             </a:fld>
             <a:endParaRPr lang="nl-NL"/>
           </a:p>
@@ -2976,7 +2976,7 @@
           <a:p>
             <a:fld id="{407978F9-E225-44FC-B6D5-6C0BF9254ECD}" type="datetimeFigureOut">
               <a:rPr lang="nl-NL" smtClean="0"/>
-              <a:t>21-3-2018</a:t>
+              <a:t>23-5-2018</a:t>
             </a:fld>
             <a:endParaRPr lang="nl-NL"/>
           </a:p>
@@ -3159,7 +3159,7 @@
           <a:p>
             <a:fld id="{407978F9-E225-44FC-B6D5-6C0BF9254ECD}" type="datetimeFigureOut">
               <a:rPr lang="nl-NL" smtClean="0"/>
-              <a:t>21-3-2018</a:t>
+              <a:t>23-5-2018</a:t>
             </a:fld>
             <a:endParaRPr lang="nl-NL"/>
           </a:p>
@@ -3332,7 +3332,7 @@
           <a:p>
             <a:fld id="{407978F9-E225-44FC-B6D5-6C0BF9254ECD}" type="datetimeFigureOut">
               <a:rPr lang="nl-NL" smtClean="0"/>
-              <a:t>21-3-2018</a:t>
+              <a:t>23-5-2018</a:t>
             </a:fld>
             <a:endParaRPr lang="nl-NL"/>
           </a:p>
@@ -3586,7 +3586,7 @@
           <a:p>
             <a:fld id="{407978F9-E225-44FC-B6D5-6C0BF9254ECD}" type="datetimeFigureOut">
               <a:rPr lang="nl-NL" smtClean="0"/>
-              <a:t>21-3-2018</a:t>
+              <a:t>23-5-2018</a:t>
             </a:fld>
             <a:endParaRPr lang="nl-NL"/>
           </a:p>
@@ -3886,7 +3886,7 @@
           <a:p>
             <a:fld id="{407978F9-E225-44FC-B6D5-6C0BF9254ECD}" type="datetimeFigureOut">
               <a:rPr lang="nl-NL" smtClean="0"/>
-              <a:t>21-3-2018</a:t>
+              <a:t>23-5-2018</a:t>
             </a:fld>
             <a:endParaRPr lang="nl-NL"/>
           </a:p>
@@ -4331,7 +4331,7 @@
           <a:p>
             <a:fld id="{407978F9-E225-44FC-B6D5-6C0BF9254ECD}" type="datetimeFigureOut">
               <a:rPr lang="nl-NL" smtClean="0"/>
-              <a:t>21-3-2018</a:t>
+              <a:t>23-5-2018</a:t>
             </a:fld>
             <a:endParaRPr lang="nl-NL"/>
           </a:p>
@@ -4452,7 +4452,7 @@
           <a:p>
             <a:fld id="{407978F9-E225-44FC-B6D5-6C0BF9254ECD}" type="datetimeFigureOut">
               <a:rPr lang="nl-NL" smtClean="0"/>
-              <a:t>21-3-2018</a:t>
+              <a:t>23-5-2018</a:t>
             </a:fld>
             <a:endParaRPr lang="nl-NL"/>
           </a:p>
@@ -4550,7 +4550,7 @@
           <a:p>
             <a:fld id="{407978F9-E225-44FC-B6D5-6C0BF9254ECD}" type="datetimeFigureOut">
               <a:rPr lang="nl-NL" smtClean="0"/>
-              <a:t>21-3-2018</a:t>
+              <a:t>23-5-2018</a:t>
             </a:fld>
             <a:endParaRPr lang="nl-NL"/>
           </a:p>
@@ -4836,7 +4836,7 @@
           <a:p>
             <a:fld id="{407978F9-E225-44FC-B6D5-6C0BF9254ECD}" type="datetimeFigureOut">
               <a:rPr lang="nl-NL" smtClean="0"/>
-              <a:t>21-3-2018</a:t>
+              <a:t>23-5-2018</a:t>
             </a:fld>
             <a:endParaRPr lang="nl-NL"/>
           </a:p>
@@ -5130,7 +5130,7 @@
           <a:p>
             <a:fld id="{407978F9-E225-44FC-B6D5-6C0BF9254ECD}" type="datetimeFigureOut">
               <a:rPr lang="nl-NL" smtClean="0"/>
-              <a:t>21-3-2018</a:t>
+              <a:t>23-5-2018</a:t>
             </a:fld>
             <a:endParaRPr lang="nl-NL"/>
           </a:p>
@@ -5663,7 +5663,7 @@
           <a:p>
             <a:fld id="{407978F9-E225-44FC-B6D5-6C0BF9254ECD}" type="datetimeFigureOut">
               <a:rPr lang="nl-NL" smtClean="0"/>
-              <a:t>21-3-2018</a:t>
+              <a:t>23-5-2018</a:t>
             </a:fld>
             <a:endParaRPr lang="nl-NL"/>
           </a:p>
@@ -6256,7 +6256,7 @@
           <a:p>
             <a:r>
               <a:rPr lang="nl-NL" dirty="0"/>
-              <a:t>Bart Brendeke, Emiel Dreef &amp; Klaas van der Linden</a:t>
+              <a:t>Bart Brendeke &amp; Klaas van der Linden</a:t>
             </a:r>
           </a:p>
         </p:txBody>
@@ -6538,12 +6538,6 @@
           <a:p>
             <a:r>
               <a:rPr lang="nl-NL" dirty="0"/>
-              <a:t>Emiel: minder nerveuze tikjes tijdens de presentatie.</a:t>
-            </a:r>
-          </a:p>
-          <a:p>
-            <a:r>
-              <a:rPr lang="nl-NL" dirty="0"/>
               <a:t>Klaas: minder snel praten.</a:t>
             </a:r>
           </a:p>
@@ -6661,92 +6655,6 @@
       </p:sp>
       <p:pic>
         <p:nvPicPr>
-          <p:cNvPr id="5" name="Afbeelding 4" descr="Afbeeldingsresultaat voor RTC DS1307 uses">
-            <a:extLst>
-              <a:ext uri="{FF2B5EF4-FFF2-40B4-BE49-F238E27FC236}">
-                <a16:creationId xmlns:a16="http://schemas.microsoft.com/office/drawing/2014/main" id="{4CEA4D09-791C-4499-A0EF-6654786453FB}"/>
-              </a:ext>
-            </a:extLst>
-          </p:cNvPr>
-          <p:cNvPicPr/>
-          <p:nvPr/>
-        </p:nvPicPr>
-        <p:blipFill>
-          <a:blip r:embed="rId2">
-            <a:extLst>
-              <a:ext uri="{28A0092B-C50C-407E-A947-70E740481C1C}">
-                <a14:useLocalDpi xmlns:a14="http://schemas.microsoft.com/office/drawing/2010/main" val="0"/>
-              </a:ext>
-            </a:extLst>
-          </a:blip>
-          <a:srcRect/>
-          <a:stretch>
-            <a:fillRect/>
-          </a:stretch>
-        </p:blipFill>
-        <p:spPr bwMode="auto">
-          <a:xfrm>
-            <a:off x="1484310" y="2144927"/>
-            <a:ext cx="6387239" cy="2674723"/>
-          </a:xfrm>
-          <a:prstGeom prst="rect">
-            <a:avLst/>
-          </a:prstGeom>
-          <a:noFill/>
-          <a:ln>
-            <a:noFill/>
-          </a:ln>
-        </p:spPr>
-      </p:pic>
-      <p:pic>
-        <p:nvPicPr>
-          <p:cNvPr id="1028" name="Picture 4" descr="Afbeeldingsresultaat voor wasmachine">
-            <a:extLst>
-              <a:ext uri="{FF2B5EF4-FFF2-40B4-BE49-F238E27FC236}">
-                <a16:creationId xmlns:a16="http://schemas.microsoft.com/office/drawing/2014/main" id="{DEFBC75A-EF7D-4779-822B-33077A7381E8}"/>
-              </a:ext>
-            </a:extLst>
-          </p:cNvPr>
-          <p:cNvPicPr>
-            <a:picLocks noChangeAspect="1" noChangeArrowheads="1"/>
-          </p:cNvPicPr>
-          <p:nvPr/>
-        </p:nvPicPr>
-        <p:blipFill>
-          <a:blip r:embed="rId3">
-            <a:extLst>
-              <a:ext uri="{28A0092B-C50C-407E-A947-70E740481C1C}">
-                <a14:useLocalDpi xmlns:a14="http://schemas.microsoft.com/office/drawing/2010/main" val="0"/>
-              </a:ext>
-            </a:extLst>
-          </a:blip>
-          <a:srcRect/>
-          <a:stretch>
-            <a:fillRect/>
-          </a:stretch>
-        </p:blipFill>
-        <p:spPr bwMode="auto">
-          <a:xfrm>
-            <a:off x="9023280" y="2305356"/>
-            <a:ext cx="2272360" cy="3012149"/>
-          </a:xfrm>
-          <a:prstGeom prst="rect">
-            <a:avLst/>
-          </a:prstGeom>
-          <a:noFill/>
-          <a:extLst>
-            <a:ext uri="{909E8E84-426E-40DD-AFC4-6F175D3DCCD1}">
-              <a14:hiddenFill xmlns:a14="http://schemas.microsoft.com/office/drawing/2010/main">
-                <a:solidFill>
-                  <a:srgbClr val="FFFFFF"/>
-                </a:solidFill>
-              </a14:hiddenFill>
-            </a:ext>
-          </a:extLst>
-        </p:spPr>
-      </p:pic>
-      <p:pic>
-        <p:nvPicPr>
           <p:cNvPr id="4098" name="Picture 2" descr="Afbeeldingsresultaat voor rtc arduino">
             <a:extLst>
               <a:ext uri="{FF2B5EF4-FFF2-40B4-BE49-F238E27FC236}">
@@ -6760,11 +6668,11 @@
           <p:nvPr/>
         </p:nvPicPr>
         <p:blipFill>
-          <a:blip r:embed="rId4">
+          <a:blip r:embed="rId2">
             <a:extLst>
               <a:ext uri="{BEBA8EAE-BF5A-486C-A8C5-ECC9F3942E4B}">
                 <a14:imgProps xmlns:a14="http://schemas.microsoft.com/office/drawing/2010/main">
-                  <a14:imgLayer r:embed="rId5">
+                  <a14:imgLayer r:embed="rId3">
                     <a14:imgEffect>
                       <a14:backgroundRemoval t="9864" b="89796" l="5435" r="96087">
                         <a14:foregroundMark x1="10870" y1="31633" x2="10870" y2="31633"/>
@@ -6804,6 +6712,53 @@
           <a:xfrm>
             <a:off x="2636041" y="4819650"/>
             <a:ext cx="3002759" cy="1919155"/>
+          </a:xfrm>
+          <a:prstGeom prst="rect">
+            <a:avLst/>
+          </a:prstGeom>
+          <a:noFill/>
+          <a:extLst>
+            <a:ext uri="{909E8E84-426E-40DD-AFC4-6F175D3DCCD1}">
+              <a14:hiddenFill xmlns:a14="http://schemas.microsoft.com/office/drawing/2010/main">
+                <a:solidFill>
+                  <a:srgbClr val="FFFFFF"/>
+                </a:solidFill>
+              </a14:hiddenFill>
+            </a:ext>
+          </a:extLst>
+        </p:spPr>
+      </p:pic>
+      <p:pic>
+        <p:nvPicPr>
+          <p:cNvPr id="1026" name="Picture 2" descr="Afbeeldingsresultaat voor personal computer">
+            <a:extLst>
+              <a:ext uri="{FF2B5EF4-FFF2-40B4-BE49-F238E27FC236}">
+                <a16:creationId xmlns:a16="http://schemas.microsoft.com/office/drawing/2014/main" id="{8C55B6F6-112D-4C8E-BC36-6179A2D620A4}"/>
+              </a:ext>
+            </a:extLst>
+          </p:cNvPr>
+          <p:cNvPicPr>
+            <a:picLocks noChangeAspect="1" noChangeArrowheads="1"/>
+          </p:cNvPicPr>
+          <p:nvPr/>
+        </p:nvPicPr>
+        <p:blipFill>
+          <a:blip r:embed="rId4">
+            <a:extLst>
+              <a:ext uri="{28A0092B-C50C-407E-A947-70E740481C1C}">
+                <a14:useLocalDpi xmlns:a14="http://schemas.microsoft.com/office/drawing/2010/main" val="0"/>
+              </a:ext>
+            </a:extLst>
+          </a:blip>
+          <a:srcRect/>
+          <a:stretch>
+            <a:fillRect/>
+          </a:stretch>
+        </p:blipFill>
+        <p:spPr bwMode="auto">
+          <a:xfrm flipH="1">
+            <a:off x="7890012" y="2521677"/>
+            <a:ext cx="3494943" cy="3257550"/>
           </a:xfrm>
           <a:prstGeom prst="rect">
             <a:avLst/>

</xml_diff>